<commit_message>
creating shells for the slides and activity worksheets
</commit_message>
<xml_diff>
--- a/slides/class01-introduction.pptx
+++ b/slides/class01-introduction.pptx
@@ -2,16 +2,16 @@
 <file path=ppt/presentation.xml><?xml version="1.0" encoding="utf-8"?>
 <p:presentation xmlns:a="http://schemas.openxmlformats.org/drawingml/2006/main" xmlns:r="http://schemas.openxmlformats.org/officeDocument/2006/relationships" xmlns:p="http://schemas.openxmlformats.org/presentationml/2006/main" saveSubsetFonts="1" autoCompressPictures="0">
   <p:sldMasterIdLst>
-    <p:sldMasterId id="2147483726" r:id="rId1"/>
+    <p:sldMasterId id="2147483738" r:id="rId1"/>
   </p:sldMasterIdLst>
   <p:sldIdLst/>
-  <p:sldSz cx="12192000" cy="6858000"/>
+  <p:sldSz cx="9906000" cy="6858000" type="A4"/>
   <p:notesSz cx="6858000" cy="9144000"/>
   <p:defaultTextStyle>
     <a:defPPr>
       <a:defRPr lang="en-US"/>
     </a:defPPr>
-    <a:lvl1pPr marL="0" algn="l" defTabSz="914400" rtl="0" eaLnBrk="1" latinLnBrk="0" hangingPunct="1">
+    <a:lvl1pPr marL="0" algn="l" defTabSz="457200" rtl="0" eaLnBrk="1" latinLnBrk="0" hangingPunct="1">
       <a:defRPr sz="1800" kern="1200">
         <a:solidFill>
           <a:schemeClr val="tx1"/>
@@ -21,7 +21,7 @@
         <a:cs typeface="+mn-cs"/>
       </a:defRPr>
     </a:lvl1pPr>
-    <a:lvl2pPr marL="457200" algn="l" defTabSz="914400" rtl="0" eaLnBrk="1" latinLnBrk="0" hangingPunct="1">
+    <a:lvl2pPr marL="457200" algn="l" defTabSz="457200" rtl="0" eaLnBrk="1" latinLnBrk="0" hangingPunct="1">
       <a:defRPr sz="1800" kern="1200">
         <a:solidFill>
           <a:schemeClr val="tx1"/>
@@ -31,7 +31,7 @@
         <a:cs typeface="+mn-cs"/>
       </a:defRPr>
     </a:lvl2pPr>
-    <a:lvl3pPr marL="914400" algn="l" defTabSz="914400" rtl="0" eaLnBrk="1" latinLnBrk="0" hangingPunct="1">
+    <a:lvl3pPr marL="914400" algn="l" defTabSz="457200" rtl="0" eaLnBrk="1" latinLnBrk="0" hangingPunct="1">
       <a:defRPr sz="1800" kern="1200">
         <a:solidFill>
           <a:schemeClr val="tx1"/>
@@ -41,7 +41,7 @@
         <a:cs typeface="+mn-cs"/>
       </a:defRPr>
     </a:lvl3pPr>
-    <a:lvl4pPr marL="1371600" algn="l" defTabSz="914400" rtl="0" eaLnBrk="1" latinLnBrk="0" hangingPunct="1">
+    <a:lvl4pPr marL="1371600" algn="l" defTabSz="457200" rtl="0" eaLnBrk="1" latinLnBrk="0" hangingPunct="1">
       <a:defRPr sz="1800" kern="1200">
         <a:solidFill>
           <a:schemeClr val="tx1"/>
@@ -51,7 +51,7 @@
         <a:cs typeface="+mn-cs"/>
       </a:defRPr>
     </a:lvl4pPr>
-    <a:lvl5pPr marL="1828800" algn="l" defTabSz="914400" rtl="0" eaLnBrk="1" latinLnBrk="0" hangingPunct="1">
+    <a:lvl5pPr marL="1828800" algn="l" defTabSz="457200" rtl="0" eaLnBrk="1" latinLnBrk="0" hangingPunct="1">
       <a:defRPr sz="1800" kern="1200">
         <a:solidFill>
           <a:schemeClr val="tx1"/>
@@ -61,7 +61,7 @@
         <a:cs typeface="+mn-cs"/>
       </a:defRPr>
     </a:lvl5pPr>
-    <a:lvl6pPr marL="2286000" algn="l" defTabSz="914400" rtl="0" eaLnBrk="1" latinLnBrk="0" hangingPunct="1">
+    <a:lvl6pPr marL="2286000" algn="l" defTabSz="457200" rtl="0" eaLnBrk="1" latinLnBrk="0" hangingPunct="1">
       <a:defRPr sz="1800" kern="1200">
         <a:solidFill>
           <a:schemeClr val="tx1"/>
@@ -71,7 +71,7 @@
         <a:cs typeface="+mn-cs"/>
       </a:defRPr>
     </a:lvl6pPr>
-    <a:lvl7pPr marL="2743200" algn="l" defTabSz="914400" rtl="0" eaLnBrk="1" latinLnBrk="0" hangingPunct="1">
+    <a:lvl7pPr marL="2743200" algn="l" defTabSz="457200" rtl="0" eaLnBrk="1" latinLnBrk="0" hangingPunct="1">
       <a:defRPr sz="1800" kern="1200">
         <a:solidFill>
           <a:schemeClr val="tx1"/>
@@ -81,7 +81,7 @@
         <a:cs typeface="+mn-cs"/>
       </a:defRPr>
     </a:lvl7pPr>
-    <a:lvl8pPr marL="3200400" algn="l" defTabSz="914400" rtl="0" eaLnBrk="1" latinLnBrk="0" hangingPunct="1">
+    <a:lvl8pPr marL="3200400" algn="l" defTabSz="457200" rtl="0" eaLnBrk="1" latinLnBrk="0" hangingPunct="1">
       <a:defRPr sz="1800" kern="1200">
         <a:solidFill>
           <a:schemeClr val="tx1"/>
@@ -91,7 +91,7 @@
         <a:cs typeface="+mn-cs"/>
       </a:defRPr>
     </a:lvl8pPr>
-    <a:lvl9pPr marL="3657600" algn="l" defTabSz="914400" rtl="0" eaLnBrk="1" latinLnBrk="0" hangingPunct="1">
+    <a:lvl9pPr marL="3657600" algn="l" defTabSz="457200" rtl="0" eaLnBrk="1" latinLnBrk="0" hangingPunct="1">
       <a:defRPr sz="1800" kern="1200">
         <a:solidFill>
           <a:schemeClr val="tx1"/>
@@ -110,7 +110,7 @@
             <a:srgbClr val="A4A3A4"/>
           </p15:clr>
         </p15:guide>
-        <p15:guide id="2" pos="3840" userDrawn="1">
+        <p15:guide id="2" pos="3120" userDrawn="1">
           <p15:clr>
             <a:srgbClr val="A4A3A4"/>
           </p15:clr>
@@ -140,13 +140,7 @@
       </p:grpSpPr>
       <p:sp>
         <p:nvSpPr>
-          <p:cNvPr id="2" name="Title 1">
-            <a:extLst>
-              <a:ext uri="{FF2B5EF4-FFF2-40B4-BE49-F238E27FC236}">
-                <a16:creationId xmlns:a16="http://schemas.microsoft.com/office/drawing/2014/main" id="{DCCD1189-C36D-4C09-AE52-8B0E514D4681}"/>
-              </a:ext>
-            </a:extLst>
-          </p:cNvPr>
+          <p:cNvPr id="2" name="Title 1"/>
           <p:cNvSpPr>
             <a:spLocks noGrp="1"/>
           </p:cNvSpPr>
@@ -156,36 +150,29 @@
         </p:nvSpPr>
         <p:spPr>
           <a:xfrm>
-            <a:off x="1524000" y="1122363"/>
-            <a:ext cx="9144000" cy="2387600"/>
+            <a:off x="742950" y="1122363"/>
+            <a:ext cx="8420100" cy="2387600"/>
           </a:xfrm>
         </p:spPr>
         <p:txBody>
-          <a:bodyPr anchor="b">
-            <a:normAutofit/>
-          </a:bodyPr>
+          <a:bodyPr anchor="b"/>
           <a:lstStyle>
             <a:lvl1pPr algn="ctr">
-              <a:defRPr sz="5600"/>
+              <a:defRPr sz="6000"/>
             </a:lvl1pPr>
           </a:lstStyle>
           <a:p>
             <a:r>
-              <a:rPr lang="en-US" dirty="0"/>
+              <a:rPr lang="en-US"/>
               <a:t>Click to edit Master title style</a:t>
             </a:r>
-          </a:p>
-        </p:txBody>
-      </p:sp>
-      <p:sp>
-        <p:nvSpPr>
-          <p:cNvPr id="3" name="Subtitle 2">
-            <a:extLst>
-              <a:ext uri="{FF2B5EF4-FFF2-40B4-BE49-F238E27FC236}">
-                <a16:creationId xmlns:a16="http://schemas.microsoft.com/office/drawing/2014/main" id="{87FB58E7-3A31-42D5-A0D4-DF64205AFA90}"/>
-              </a:ext>
-            </a:extLst>
-          </p:cNvPr>
+            <a:endParaRPr lang="en-US" dirty="0"/>
+          </a:p>
+        </p:txBody>
+      </p:sp>
+      <p:sp>
+        <p:nvSpPr>
+          <p:cNvPr id="3" name="Subtitle 2"/>
           <p:cNvSpPr>
             <a:spLocks noGrp="1"/>
           </p:cNvSpPr>
@@ -195,18 +182,16 @@
         </p:nvSpPr>
         <p:spPr>
           <a:xfrm>
-            <a:off x="1524000" y="3602038"/>
-            <a:ext cx="9144000" cy="1655762"/>
+            <a:off x="1238250" y="3602038"/>
+            <a:ext cx="7429500" cy="1655762"/>
           </a:xfrm>
         </p:spPr>
         <p:txBody>
-          <a:bodyPr>
-            <a:normAutofit/>
-          </a:bodyPr>
+          <a:bodyPr/>
           <a:lstStyle>
             <a:lvl1pPr marL="0" indent="0" algn="ctr">
               <a:buNone/>
-              <a:defRPr sz="2800"/>
+              <a:defRPr sz="2400"/>
             </a:lvl1pPr>
             <a:lvl2pPr marL="457200" indent="0" algn="ctr">
               <a:buNone/>
@@ -243,21 +228,16 @@
           </a:lstStyle>
           <a:p>
             <a:r>
-              <a:rPr lang="en-US" dirty="0"/>
+              <a:rPr lang="en-US"/>
               <a:t>Click to edit Master subtitle style</a:t>
             </a:r>
-          </a:p>
-        </p:txBody>
-      </p:sp>
-      <p:sp>
-        <p:nvSpPr>
-          <p:cNvPr id="4" name="Date Placeholder 3">
-            <a:extLst>
-              <a:ext uri="{FF2B5EF4-FFF2-40B4-BE49-F238E27FC236}">
-                <a16:creationId xmlns:a16="http://schemas.microsoft.com/office/drawing/2014/main" id="{24CAF3E2-54C4-4676-A45E-76BC4B681DC1}"/>
-              </a:ext>
-            </a:extLst>
-          </p:cNvPr>
+            <a:endParaRPr lang="en-US" dirty="0"/>
+          </a:p>
+        </p:txBody>
+      </p:sp>
+      <p:sp>
+        <p:nvSpPr>
+          <p:cNvPr id="4" name="Date Placeholder 3"/>
           <p:cNvSpPr>
             <a:spLocks noGrp="1"/>
           </p:cNvSpPr>
@@ -272,7 +252,7 @@
           <a:p>
             <a:fld id="{241EB5C9-1307-BA42-ABA2-0BC069CD8E7F}" type="datetimeFigureOut">
               <a:rPr lang="en-US" smtClean="0"/>
-              <a:t>1/18/2019</a:t>
+              <a:t>1/19/2019</a:t>
             </a:fld>
             <a:endParaRPr lang="en-US"/>
           </a:p>
@@ -280,13 +260,7 @@
       </p:sp>
       <p:sp>
         <p:nvSpPr>
-          <p:cNvPr id="5" name="Footer Placeholder 4">
-            <a:extLst>
-              <a:ext uri="{FF2B5EF4-FFF2-40B4-BE49-F238E27FC236}">
-                <a16:creationId xmlns:a16="http://schemas.microsoft.com/office/drawing/2014/main" id="{66594A28-FD60-4F11-8DD6-7ABC20610334}"/>
-              </a:ext>
-            </a:extLst>
-          </p:cNvPr>
+          <p:cNvPr id="5" name="Footer Placeholder 4"/>
           <p:cNvSpPr>
             <a:spLocks noGrp="1"/>
           </p:cNvSpPr>
@@ -305,13 +279,7 @@
       </p:sp>
       <p:sp>
         <p:nvSpPr>
-          <p:cNvPr id="6" name="Slide Number Placeholder 5">
-            <a:extLst>
-              <a:ext uri="{FF2B5EF4-FFF2-40B4-BE49-F238E27FC236}">
-                <a16:creationId xmlns:a16="http://schemas.microsoft.com/office/drawing/2014/main" id="{66842BA8-0281-4EC8-8A32-21E9E2B47C06}"/>
-              </a:ext>
-            </a:extLst>
-          </p:cNvPr>
+          <p:cNvPr id="6" name="Slide Number Placeholder 5"/>
           <p:cNvSpPr>
             <a:spLocks noGrp="1"/>
           </p:cNvSpPr>
@@ -335,7 +303,7 @@
     </p:spTree>
     <p:extLst>
       <p:ext uri="{BB962C8B-B14F-4D97-AF65-F5344CB8AC3E}">
-        <p14:creationId xmlns:p14="http://schemas.microsoft.com/office/powerpoint/2010/main" val="620842541"/>
+        <p14:creationId xmlns:p14="http://schemas.microsoft.com/office/powerpoint/2010/main" val="1490408290"/>
       </p:ext>
     </p:extLst>
   </p:cSld>
@@ -364,13 +332,7 @@
       </p:grpSpPr>
       <p:sp>
         <p:nvSpPr>
-          <p:cNvPr id="2" name="Title 1">
-            <a:extLst>
-              <a:ext uri="{FF2B5EF4-FFF2-40B4-BE49-F238E27FC236}">
-                <a16:creationId xmlns:a16="http://schemas.microsoft.com/office/drawing/2014/main" id="{1D37A60C-9D8D-4F31-90E2-944817875124}"/>
-              </a:ext>
-            </a:extLst>
-          </p:cNvPr>
+          <p:cNvPr id="2" name="Title 1"/>
           <p:cNvSpPr>
             <a:spLocks noGrp="1"/>
           </p:cNvSpPr>
@@ -387,18 +349,13 @@
               <a:rPr lang="en-US"/>
               <a:t>Click to edit Master title style</a:t>
             </a:r>
-          </a:p>
-        </p:txBody>
-      </p:sp>
-      <p:sp>
-        <p:nvSpPr>
-          <p:cNvPr id="3" name="Vertical Text Placeholder 2">
-            <a:extLst>
-              <a:ext uri="{FF2B5EF4-FFF2-40B4-BE49-F238E27FC236}">
-                <a16:creationId xmlns:a16="http://schemas.microsoft.com/office/drawing/2014/main" id="{592E1A31-E6B3-4686-9E4B-5909DF3FA887}"/>
-              </a:ext>
-            </a:extLst>
-          </p:cNvPr>
+            <a:endParaRPr lang="en-US" dirty="0"/>
+          </a:p>
+        </p:txBody>
+      </p:sp>
+      <p:sp>
+        <p:nvSpPr>
+          <p:cNvPr id="3" name="Vertical Text Placeholder 2"/>
           <p:cNvSpPr>
             <a:spLocks noGrp="1"/>
           </p:cNvSpPr>
@@ -444,18 +401,13 @@
               <a:rPr lang="en-US"/>
               <a:t>Fifth level</a:t>
             </a:r>
-          </a:p>
-        </p:txBody>
-      </p:sp>
-      <p:sp>
-        <p:nvSpPr>
-          <p:cNvPr id="4" name="Date Placeholder 3">
-            <a:extLst>
-              <a:ext uri="{FF2B5EF4-FFF2-40B4-BE49-F238E27FC236}">
-                <a16:creationId xmlns:a16="http://schemas.microsoft.com/office/drawing/2014/main" id="{B1DD226E-04A4-4AF0-8427-FE6546105668}"/>
-              </a:ext>
-            </a:extLst>
-          </p:cNvPr>
+            <a:endParaRPr lang="en-US" dirty="0"/>
+          </a:p>
+        </p:txBody>
+      </p:sp>
+      <p:sp>
+        <p:nvSpPr>
+          <p:cNvPr id="4" name="Date Placeholder 3"/>
           <p:cNvSpPr>
             <a:spLocks noGrp="1"/>
           </p:cNvSpPr>
@@ -470,7 +422,7 @@
           <a:p>
             <a:fld id="{241EB5C9-1307-BA42-ABA2-0BC069CD8E7F}" type="datetimeFigureOut">
               <a:rPr lang="en-US" smtClean="0"/>
-              <a:t>1/18/2019</a:t>
+              <a:t>1/19/2019</a:t>
             </a:fld>
             <a:endParaRPr lang="en-US"/>
           </a:p>
@@ -478,13 +430,7 @@
       </p:sp>
       <p:sp>
         <p:nvSpPr>
-          <p:cNvPr id="5" name="Footer Placeholder 4">
-            <a:extLst>
-              <a:ext uri="{FF2B5EF4-FFF2-40B4-BE49-F238E27FC236}">
-                <a16:creationId xmlns:a16="http://schemas.microsoft.com/office/drawing/2014/main" id="{FC6BE4B6-88E6-4EEE-908A-FC62B0E23851}"/>
-              </a:ext>
-            </a:extLst>
-          </p:cNvPr>
+          <p:cNvPr id="5" name="Footer Placeholder 4"/>
           <p:cNvSpPr>
             <a:spLocks noGrp="1"/>
           </p:cNvSpPr>
@@ -503,13 +449,7 @@
       </p:sp>
       <p:sp>
         <p:nvSpPr>
-          <p:cNvPr id="6" name="Slide Number Placeholder 5">
-            <a:extLst>
-              <a:ext uri="{FF2B5EF4-FFF2-40B4-BE49-F238E27FC236}">
-                <a16:creationId xmlns:a16="http://schemas.microsoft.com/office/drawing/2014/main" id="{637F01FD-F52A-42EF-9EB1-0ACA58FD34C2}"/>
-              </a:ext>
-            </a:extLst>
-          </p:cNvPr>
+          <p:cNvPr id="6" name="Slide Number Placeholder 5"/>
           <p:cNvSpPr>
             <a:spLocks noGrp="1"/>
           </p:cNvSpPr>
@@ -533,7 +473,7 @@
     </p:spTree>
     <p:extLst>
       <p:ext uri="{BB962C8B-B14F-4D97-AF65-F5344CB8AC3E}">
-        <p14:creationId xmlns:p14="http://schemas.microsoft.com/office/powerpoint/2010/main" val="1242589588"/>
+        <p14:creationId xmlns:p14="http://schemas.microsoft.com/office/powerpoint/2010/main" val="1160897250"/>
       </p:ext>
     </p:extLst>
   </p:cSld>
@@ -562,13 +502,7 @@
       </p:grpSpPr>
       <p:sp>
         <p:nvSpPr>
-          <p:cNvPr id="2" name="Vertical Title 1">
-            <a:extLst>
-              <a:ext uri="{FF2B5EF4-FFF2-40B4-BE49-F238E27FC236}">
-                <a16:creationId xmlns:a16="http://schemas.microsoft.com/office/drawing/2014/main" id="{C5AD5B52-7BAD-4BC7-B261-F77315EA865E}"/>
-              </a:ext>
-            </a:extLst>
-          </p:cNvPr>
+          <p:cNvPr id="2" name="Vertical Title 1"/>
           <p:cNvSpPr>
             <a:spLocks noGrp="1"/>
           </p:cNvSpPr>
@@ -578,8 +512,8 @@
         </p:nvSpPr>
         <p:spPr>
           <a:xfrm>
-            <a:off x="8724900" y="365125"/>
-            <a:ext cx="2628900" cy="5811838"/>
+            <a:off x="7088982" y="365125"/>
+            <a:ext cx="2135981" cy="5811838"/>
           </a:xfrm>
         </p:spPr>
         <p:txBody>
@@ -590,18 +524,13 @@
               <a:rPr lang="en-US"/>
               <a:t>Click to edit Master title style</a:t>
             </a:r>
-          </a:p>
-        </p:txBody>
-      </p:sp>
-      <p:sp>
-        <p:nvSpPr>
-          <p:cNvPr id="3" name="Vertical Text Placeholder 2">
-            <a:extLst>
-              <a:ext uri="{FF2B5EF4-FFF2-40B4-BE49-F238E27FC236}">
-                <a16:creationId xmlns:a16="http://schemas.microsoft.com/office/drawing/2014/main" id="{76CD2E75-A0C2-4E64-A5B4-0333861CF637}"/>
-              </a:ext>
-            </a:extLst>
-          </p:cNvPr>
+            <a:endParaRPr lang="en-US" dirty="0"/>
+          </a:p>
+        </p:txBody>
+      </p:sp>
+      <p:sp>
+        <p:nvSpPr>
+          <p:cNvPr id="3" name="Vertical Text Placeholder 2"/>
           <p:cNvSpPr>
             <a:spLocks noGrp="1"/>
           </p:cNvSpPr>
@@ -611,8 +540,8 @@
         </p:nvSpPr>
         <p:spPr>
           <a:xfrm>
-            <a:off x="838200" y="365125"/>
-            <a:ext cx="7734300" cy="5811838"/>
+            <a:off x="681038" y="365125"/>
+            <a:ext cx="6284119" cy="5811838"/>
           </a:xfrm>
         </p:spPr>
         <p:txBody>
@@ -652,18 +581,13 @@
               <a:rPr lang="en-US"/>
               <a:t>Fifth level</a:t>
             </a:r>
-          </a:p>
-        </p:txBody>
-      </p:sp>
-      <p:sp>
-        <p:nvSpPr>
-          <p:cNvPr id="4" name="Date Placeholder 3">
-            <a:extLst>
-              <a:ext uri="{FF2B5EF4-FFF2-40B4-BE49-F238E27FC236}">
-                <a16:creationId xmlns:a16="http://schemas.microsoft.com/office/drawing/2014/main" id="{301EE64C-657A-44B1-81EB-62BB718B2A0B}"/>
-              </a:ext>
-            </a:extLst>
-          </p:cNvPr>
+            <a:endParaRPr lang="en-US" dirty="0"/>
+          </a:p>
+        </p:txBody>
+      </p:sp>
+      <p:sp>
+        <p:nvSpPr>
+          <p:cNvPr id="4" name="Date Placeholder 3"/>
           <p:cNvSpPr>
             <a:spLocks noGrp="1"/>
           </p:cNvSpPr>
@@ -678,7 +602,7 @@
           <a:p>
             <a:fld id="{241EB5C9-1307-BA42-ABA2-0BC069CD8E7F}" type="datetimeFigureOut">
               <a:rPr lang="en-US" smtClean="0"/>
-              <a:t>1/18/2019</a:t>
+              <a:t>1/19/2019</a:t>
             </a:fld>
             <a:endParaRPr lang="en-US"/>
           </a:p>
@@ -686,13 +610,7 @@
       </p:sp>
       <p:sp>
         <p:nvSpPr>
-          <p:cNvPr id="5" name="Footer Placeholder 4">
-            <a:extLst>
-              <a:ext uri="{FF2B5EF4-FFF2-40B4-BE49-F238E27FC236}">
-                <a16:creationId xmlns:a16="http://schemas.microsoft.com/office/drawing/2014/main" id="{54DFDBCC-E11A-49F8-ABC4-46EDA435CE31}"/>
-              </a:ext>
-            </a:extLst>
-          </p:cNvPr>
+          <p:cNvPr id="5" name="Footer Placeholder 4"/>
           <p:cNvSpPr>
             <a:spLocks noGrp="1"/>
           </p:cNvSpPr>
@@ -711,13 +629,7 @@
       </p:sp>
       <p:sp>
         <p:nvSpPr>
-          <p:cNvPr id="6" name="Slide Number Placeholder 5">
-            <a:extLst>
-              <a:ext uri="{FF2B5EF4-FFF2-40B4-BE49-F238E27FC236}">
-                <a16:creationId xmlns:a16="http://schemas.microsoft.com/office/drawing/2014/main" id="{4B2432F8-EFBD-4B5B-AD3F-D4EA1CE81D95}"/>
-              </a:ext>
-            </a:extLst>
-          </p:cNvPr>
+          <p:cNvPr id="6" name="Slide Number Placeholder 5"/>
           <p:cNvSpPr>
             <a:spLocks noGrp="1"/>
           </p:cNvSpPr>
@@ -741,7 +653,7 @@
     </p:spTree>
     <p:extLst>
       <p:ext uri="{BB962C8B-B14F-4D97-AF65-F5344CB8AC3E}">
-        <p14:creationId xmlns:p14="http://schemas.microsoft.com/office/powerpoint/2010/main" val="3594967016"/>
+        <p14:creationId xmlns:p14="http://schemas.microsoft.com/office/powerpoint/2010/main" val="3926694169"/>
       </p:ext>
     </p:extLst>
   </p:cSld>
@@ -770,13 +682,7 @@
       </p:grpSpPr>
       <p:sp>
         <p:nvSpPr>
-          <p:cNvPr id="2" name="Title 1">
-            <a:extLst>
-              <a:ext uri="{FF2B5EF4-FFF2-40B4-BE49-F238E27FC236}">
-                <a16:creationId xmlns:a16="http://schemas.microsoft.com/office/drawing/2014/main" id="{9D91457F-9E56-49B3-B9F7-581A971AA320}"/>
-              </a:ext>
-            </a:extLst>
-          </p:cNvPr>
+          <p:cNvPr id="2" name="Title 1"/>
           <p:cNvSpPr>
             <a:spLocks noGrp="1"/>
           </p:cNvSpPr>
@@ -790,21 +696,16 @@
           <a:lstStyle/>
           <a:p>
             <a:r>
-              <a:rPr lang="en-US" dirty="0"/>
+              <a:rPr lang="en-US"/>
               <a:t>Click to edit Master title style</a:t>
             </a:r>
-          </a:p>
-        </p:txBody>
-      </p:sp>
-      <p:sp>
-        <p:nvSpPr>
-          <p:cNvPr id="3" name="Content Placeholder 2">
-            <a:extLst>
-              <a:ext uri="{FF2B5EF4-FFF2-40B4-BE49-F238E27FC236}">
-                <a16:creationId xmlns:a16="http://schemas.microsoft.com/office/drawing/2014/main" id="{63410A5E-EE94-439F-8158-5697CA141D92}"/>
-              </a:ext>
-            </a:extLst>
-          </p:cNvPr>
+            <a:endParaRPr lang="en-US" dirty="0"/>
+          </a:p>
+        </p:txBody>
+      </p:sp>
+      <p:sp>
+        <p:nvSpPr>
+          <p:cNvPr id="3" name="Content Placeholder 2"/>
           <p:cNvSpPr>
             <a:spLocks noGrp="1"/>
           </p:cNvSpPr>
@@ -850,18 +751,13 @@
               <a:rPr lang="en-US"/>
               <a:t>Fifth level</a:t>
             </a:r>
-          </a:p>
-        </p:txBody>
-      </p:sp>
-      <p:sp>
-        <p:nvSpPr>
-          <p:cNvPr id="4" name="Date Placeholder 3">
-            <a:extLst>
-              <a:ext uri="{FF2B5EF4-FFF2-40B4-BE49-F238E27FC236}">
-                <a16:creationId xmlns:a16="http://schemas.microsoft.com/office/drawing/2014/main" id="{C17C5074-5165-4BDB-9FCA-DC45D03AC94A}"/>
-              </a:ext>
-            </a:extLst>
-          </p:cNvPr>
+            <a:endParaRPr lang="en-US" dirty="0"/>
+          </a:p>
+        </p:txBody>
+      </p:sp>
+      <p:sp>
+        <p:nvSpPr>
+          <p:cNvPr id="4" name="Date Placeholder 3"/>
           <p:cNvSpPr>
             <a:spLocks noGrp="1"/>
           </p:cNvSpPr>
@@ -876,7 +772,7 @@
           <a:p>
             <a:fld id="{241EB5C9-1307-BA42-ABA2-0BC069CD8E7F}" type="datetimeFigureOut">
               <a:rPr lang="en-US" smtClean="0"/>
-              <a:t>1/18/2019</a:t>
+              <a:t>1/19/2019</a:t>
             </a:fld>
             <a:endParaRPr lang="en-US"/>
           </a:p>
@@ -884,13 +780,7 @@
       </p:sp>
       <p:sp>
         <p:nvSpPr>
-          <p:cNvPr id="5" name="Footer Placeholder 4">
-            <a:extLst>
-              <a:ext uri="{FF2B5EF4-FFF2-40B4-BE49-F238E27FC236}">
-                <a16:creationId xmlns:a16="http://schemas.microsoft.com/office/drawing/2014/main" id="{2DC793DB-605B-4029-A82B-93495B5BF42E}"/>
-              </a:ext>
-            </a:extLst>
-          </p:cNvPr>
+          <p:cNvPr id="5" name="Footer Placeholder 4"/>
           <p:cNvSpPr>
             <a:spLocks noGrp="1"/>
           </p:cNvSpPr>
@@ -909,13 +799,7 @@
       </p:sp>
       <p:sp>
         <p:nvSpPr>
-          <p:cNvPr id="6" name="Slide Number Placeholder 5">
-            <a:extLst>
-              <a:ext uri="{FF2B5EF4-FFF2-40B4-BE49-F238E27FC236}">
-                <a16:creationId xmlns:a16="http://schemas.microsoft.com/office/drawing/2014/main" id="{D226CB76-CB3E-4518-8702-7EEDFC341D18}"/>
-              </a:ext>
-            </a:extLst>
-          </p:cNvPr>
+          <p:cNvPr id="6" name="Slide Number Placeholder 5"/>
           <p:cNvSpPr>
             <a:spLocks noGrp="1"/>
           </p:cNvSpPr>
@@ -939,7 +823,7 @@
     </p:spTree>
     <p:extLst>
       <p:ext uri="{BB962C8B-B14F-4D97-AF65-F5344CB8AC3E}">
-        <p14:creationId xmlns:p14="http://schemas.microsoft.com/office/powerpoint/2010/main" val="3143350272"/>
+        <p14:creationId xmlns:p14="http://schemas.microsoft.com/office/powerpoint/2010/main" val="1686305239"/>
       </p:ext>
     </p:extLst>
   </p:cSld>
@@ -968,13 +852,7 @@
       </p:grpSpPr>
       <p:sp>
         <p:nvSpPr>
-          <p:cNvPr id="2" name="Title 1">
-            <a:extLst>
-              <a:ext uri="{FF2B5EF4-FFF2-40B4-BE49-F238E27FC236}">
-                <a16:creationId xmlns:a16="http://schemas.microsoft.com/office/drawing/2014/main" id="{3093E061-200E-450F-9E84-DDF3D7AEC2FC}"/>
-              </a:ext>
-            </a:extLst>
-          </p:cNvPr>
+          <p:cNvPr id="2" name="Title 1"/>
           <p:cNvSpPr>
             <a:spLocks noGrp="1"/>
           </p:cNvSpPr>
@@ -984,36 +862,29 @@
         </p:nvSpPr>
         <p:spPr>
           <a:xfrm>
-            <a:off x="831850" y="1709738"/>
-            <a:ext cx="10515600" cy="2852737"/>
+            <a:off x="675879" y="1709740"/>
+            <a:ext cx="8543925" cy="2852737"/>
           </a:xfrm>
         </p:spPr>
         <p:txBody>
-          <a:bodyPr anchor="b">
-            <a:normAutofit/>
-          </a:bodyPr>
+          <a:bodyPr anchor="b"/>
           <a:lstStyle>
             <a:lvl1pPr>
-              <a:defRPr sz="5600"/>
+              <a:defRPr sz="6000"/>
             </a:lvl1pPr>
           </a:lstStyle>
           <a:p>
             <a:r>
-              <a:rPr lang="en-US" dirty="0"/>
+              <a:rPr lang="en-US"/>
               <a:t>Click to edit Master title style</a:t>
             </a:r>
-          </a:p>
-        </p:txBody>
-      </p:sp>
-      <p:sp>
-        <p:nvSpPr>
-          <p:cNvPr id="3" name="Text Placeholder 2">
-            <a:extLst>
-              <a:ext uri="{FF2B5EF4-FFF2-40B4-BE49-F238E27FC236}">
-                <a16:creationId xmlns:a16="http://schemas.microsoft.com/office/drawing/2014/main" id="{B55C79E6-D1DD-4201-AE1D-F285CEC9F2D2}"/>
-              </a:ext>
-            </a:extLst>
-          </p:cNvPr>
+            <a:endParaRPr lang="en-US" dirty="0"/>
+          </a:p>
+        </p:txBody>
+      </p:sp>
+      <p:sp>
+        <p:nvSpPr>
+          <p:cNvPr id="3" name="Text Placeholder 2"/>
           <p:cNvSpPr>
             <a:spLocks noGrp="1"/>
           </p:cNvSpPr>
@@ -1023,8 +894,8 @@
         </p:nvSpPr>
         <p:spPr>
           <a:xfrm>
-            <a:off x="831850" y="4589463"/>
-            <a:ext cx="10515600" cy="1500187"/>
+            <a:off x="675879" y="4589465"/>
+            <a:ext cx="8543925" cy="1500187"/>
           </a:xfrm>
         </p:spPr>
         <p:txBody>
@@ -1034,9 +905,7 @@
               <a:buNone/>
               <a:defRPr sz="2400">
                 <a:solidFill>
-                  <a:schemeClr val="tx1">
-                    <a:tint val="75000"/>
-                  </a:schemeClr>
+                  <a:schemeClr val="tx1"/>
                 </a:solidFill>
               </a:defRPr>
             </a:lvl1pPr>
@@ -1132,13 +1001,7 @@
       </p:sp>
       <p:sp>
         <p:nvSpPr>
-          <p:cNvPr id="4" name="Date Placeholder 3">
-            <a:extLst>
-              <a:ext uri="{FF2B5EF4-FFF2-40B4-BE49-F238E27FC236}">
-                <a16:creationId xmlns:a16="http://schemas.microsoft.com/office/drawing/2014/main" id="{8DE5141C-236C-4CD9-B827-2BB7B7D8EF09}"/>
-              </a:ext>
-            </a:extLst>
-          </p:cNvPr>
+          <p:cNvPr id="4" name="Date Placeholder 3"/>
           <p:cNvSpPr>
             <a:spLocks noGrp="1"/>
           </p:cNvSpPr>
@@ -1153,7 +1016,7 @@
           <a:p>
             <a:fld id="{241EB5C9-1307-BA42-ABA2-0BC069CD8E7F}" type="datetimeFigureOut">
               <a:rPr lang="en-US" smtClean="0"/>
-              <a:t>1/18/2019</a:t>
+              <a:t>1/19/2019</a:t>
             </a:fld>
             <a:endParaRPr lang="en-US"/>
           </a:p>
@@ -1161,13 +1024,7 @@
       </p:sp>
       <p:sp>
         <p:nvSpPr>
-          <p:cNvPr id="5" name="Footer Placeholder 4">
-            <a:extLst>
-              <a:ext uri="{FF2B5EF4-FFF2-40B4-BE49-F238E27FC236}">
-                <a16:creationId xmlns:a16="http://schemas.microsoft.com/office/drawing/2014/main" id="{B42910E5-C474-4615-84C9-534FD401EB82}"/>
-              </a:ext>
-            </a:extLst>
-          </p:cNvPr>
+          <p:cNvPr id="5" name="Footer Placeholder 4"/>
           <p:cNvSpPr>
             <a:spLocks noGrp="1"/>
           </p:cNvSpPr>
@@ -1186,13 +1043,7 @@
       </p:sp>
       <p:sp>
         <p:nvSpPr>
-          <p:cNvPr id="6" name="Slide Number Placeholder 5">
-            <a:extLst>
-              <a:ext uri="{FF2B5EF4-FFF2-40B4-BE49-F238E27FC236}">
-                <a16:creationId xmlns:a16="http://schemas.microsoft.com/office/drawing/2014/main" id="{1EC8FC0A-6E2B-4A9F-A505-AF3DF4C9CDB3}"/>
-              </a:ext>
-            </a:extLst>
-          </p:cNvPr>
+          <p:cNvPr id="6" name="Slide Number Placeholder 5"/>
           <p:cNvSpPr>
             <a:spLocks noGrp="1"/>
           </p:cNvSpPr>
@@ -1216,7 +1067,7 @@
     </p:spTree>
     <p:extLst>
       <p:ext uri="{BB962C8B-B14F-4D97-AF65-F5344CB8AC3E}">
-        <p14:creationId xmlns:p14="http://schemas.microsoft.com/office/powerpoint/2010/main" val="2633428211"/>
+        <p14:creationId xmlns:p14="http://schemas.microsoft.com/office/powerpoint/2010/main" val="2597356551"/>
       </p:ext>
     </p:extLst>
   </p:cSld>
@@ -1245,13 +1096,7 @@
       </p:grpSpPr>
       <p:sp>
         <p:nvSpPr>
-          <p:cNvPr id="2" name="Title 1">
-            <a:extLst>
-              <a:ext uri="{FF2B5EF4-FFF2-40B4-BE49-F238E27FC236}">
-                <a16:creationId xmlns:a16="http://schemas.microsoft.com/office/drawing/2014/main" id="{BEA5DF76-405E-4A74-90CC-62D0DD963984}"/>
-              </a:ext>
-            </a:extLst>
-          </p:cNvPr>
+          <p:cNvPr id="2" name="Title 1"/>
           <p:cNvSpPr>
             <a:spLocks noGrp="1"/>
           </p:cNvSpPr>
@@ -1265,21 +1110,16 @@
           <a:lstStyle/>
           <a:p>
             <a:r>
-              <a:rPr lang="en-US" dirty="0"/>
+              <a:rPr lang="en-US"/>
               <a:t>Click to edit Master title style</a:t>
             </a:r>
-          </a:p>
-        </p:txBody>
-      </p:sp>
-      <p:sp>
-        <p:nvSpPr>
-          <p:cNvPr id="3" name="Content Placeholder 2">
-            <a:extLst>
-              <a:ext uri="{FF2B5EF4-FFF2-40B4-BE49-F238E27FC236}">
-                <a16:creationId xmlns:a16="http://schemas.microsoft.com/office/drawing/2014/main" id="{B65F7D2B-B44C-4732-8CB1-E8C7EE8C39DD}"/>
-              </a:ext>
-            </a:extLst>
-          </p:cNvPr>
+            <a:endParaRPr lang="en-US" dirty="0"/>
+          </a:p>
+        </p:txBody>
+      </p:sp>
+      <p:sp>
+        <p:nvSpPr>
+          <p:cNvPr id="3" name="Content Placeholder 2"/>
           <p:cNvSpPr>
             <a:spLocks noGrp="1"/>
           </p:cNvSpPr>
@@ -1289,8 +1129,8 @@
         </p:nvSpPr>
         <p:spPr>
           <a:xfrm>
-            <a:off x="838200" y="1825625"/>
-            <a:ext cx="5181600" cy="4351338"/>
+            <a:off x="681038" y="1825625"/>
+            <a:ext cx="4210050" cy="4351338"/>
           </a:xfrm>
         </p:spPr>
         <p:txBody>
@@ -1330,18 +1170,13 @@
               <a:rPr lang="en-US"/>
               <a:t>Fifth level</a:t>
             </a:r>
-          </a:p>
-        </p:txBody>
-      </p:sp>
-      <p:sp>
-        <p:nvSpPr>
-          <p:cNvPr id="4" name="Content Placeholder 3">
-            <a:extLst>
-              <a:ext uri="{FF2B5EF4-FFF2-40B4-BE49-F238E27FC236}">
-                <a16:creationId xmlns:a16="http://schemas.microsoft.com/office/drawing/2014/main" id="{CB712114-E8D3-48EC-98BB-783427CEC6AE}"/>
-              </a:ext>
-            </a:extLst>
-          </p:cNvPr>
+            <a:endParaRPr lang="en-US" dirty="0"/>
+          </a:p>
+        </p:txBody>
+      </p:sp>
+      <p:sp>
+        <p:nvSpPr>
+          <p:cNvPr id="4" name="Content Placeholder 3"/>
           <p:cNvSpPr>
             <a:spLocks noGrp="1"/>
           </p:cNvSpPr>
@@ -1351,8 +1186,8 @@
         </p:nvSpPr>
         <p:spPr>
           <a:xfrm>
-            <a:off x="6172200" y="1825625"/>
-            <a:ext cx="5181600" cy="4351338"/>
+            <a:off x="5014913" y="1825625"/>
+            <a:ext cx="4210050" cy="4351338"/>
           </a:xfrm>
         </p:spPr>
         <p:txBody>
@@ -1392,18 +1227,13 @@
               <a:rPr lang="en-US"/>
               <a:t>Fifth level</a:t>
             </a:r>
-          </a:p>
-        </p:txBody>
-      </p:sp>
-      <p:sp>
-        <p:nvSpPr>
-          <p:cNvPr id="5" name="Date Placeholder 4">
-            <a:extLst>
-              <a:ext uri="{FF2B5EF4-FFF2-40B4-BE49-F238E27FC236}">
-                <a16:creationId xmlns:a16="http://schemas.microsoft.com/office/drawing/2014/main" id="{D1F6565C-663C-4891-9019-D4802436CA3B}"/>
-              </a:ext>
-            </a:extLst>
-          </p:cNvPr>
+            <a:endParaRPr lang="en-US" dirty="0"/>
+          </a:p>
+        </p:txBody>
+      </p:sp>
+      <p:sp>
+        <p:nvSpPr>
+          <p:cNvPr id="5" name="Date Placeholder 4"/>
           <p:cNvSpPr>
             <a:spLocks noGrp="1"/>
           </p:cNvSpPr>
@@ -1418,7 +1248,7 @@
           <a:p>
             <a:fld id="{241EB5C9-1307-BA42-ABA2-0BC069CD8E7F}" type="datetimeFigureOut">
               <a:rPr lang="en-US" smtClean="0"/>
-              <a:t>1/18/2019</a:t>
+              <a:t>1/19/2019</a:t>
             </a:fld>
             <a:endParaRPr lang="en-US"/>
           </a:p>
@@ -1426,13 +1256,7 @@
       </p:sp>
       <p:sp>
         <p:nvSpPr>
-          <p:cNvPr id="6" name="Footer Placeholder 5">
-            <a:extLst>
-              <a:ext uri="{FF2B5EF4-FFF2-40B4-BE49-F238E27FC236}">
-                <a16:creationId xmlns:a16="http://schemas.microsoft.com/office/drawing/2014/main" id="{DA3B9ADE-DF21-4C63-9906-1FA3794E5FB9}"/>
-              </a:ext>
-            </a:extLst>
-          </p:cNvPr>
+          <p:cNvPr id="6" name="Footer Placeholder 5"/>
           <p:cNvSpPr>
             <a:spLocks noGrp="1"/>
           </p:cNvSpPr>
@@ -1451,13 +1275,7 @@
       </p:sp>
       <p:sp>
         <p:nvSpPr>
-          <p:cNvPr id="7" name="Slide Number Placeholder 6">
-            <a:extLst>
-              <a:ext uri="{FF2B5EF4-FFF2-40B4-BE49-F238E27FC236}">
-                <a16:creationId xmlns:a16="http://schemas.microsoft.com/office/drawing/2014/main" id="{CA42162D-A590-4E6B-AA74-A4D560637EB0}"/>
-              </a:ext>
-            </a:extLst>
-          </p:cNvPr>
+          <p:cNvPr id="7" name="Slide Number Placeholder 6"/>
           <p:cNvSpPr>
             <a:spLocks noGrp="1"/>
           </p:cNvSpPr>
@@ -1481,7 +1299,7 @@
     </p:spTree>
     <p:extLst>
       <p:ext uri="{BB962C8B-B14F-4D97-AF65-F5344CB8AC3E}">
-        <p14:creationId xmlns:p14="http://schemas.microsoft.com/office/powerpoint/2010/main" val="853300937"/>
+        <p14:creationId xmlns:p14="http://schemas.microsoft.com/office/powerpoint/2010/main" val="3994084989"/>
       </p:ext>
     </p:extLst>
   </p:cSld>
@@ -1510,13 +1328,7 @@
       </p:grpSpPr>
       <p:sp>
         <p:nvSpPr>
-          <p:cNvPr id="2" name="Title 1">
-            <a:extLst>
-              <a:ext uri="{FF2B5EF4-FFF2-40B4-BE49-F238E27FC236}">
-                <a16:creationId xmlns:a16="http://schemas.microsoft.com/office/drawing/2014/main" id="{246D537F-F0FE-4CB9-A520-41C0A3F10B4E}"/>
-              </a:ext>
-            </a:extLst>
-          </p:cNvPr>
+          <p:cNvPr id="2" name="Title 1"/>
           <p:cNvSpPr>
             <a:spLocks noGrp="1"/>
           </p:cNvSpPr>
@@ -1526,8 +1338,8 @@
         </p:nvSpPr>
         <p:spPr>
           <a:xfrm>
-            <a:off x="839788" y="365125"/>
-            <a:ext cx="10515600" cy="1325563"/>
+            <a:off x="682328" y="365127"/>
+            <a:ext cx="8543925" cy="1325563"/>
           </a:xfrm>
         </p:spPr>
         <p:txBody>
@@ -1538,18 +1350,13 @@
               <a:rPr lang="en-US"/>
               <a:t>Click to edit Master title style</a:t>
             </a:r>
-          </a:p>
-        </p:txBody>
-      </p:sp>
-      <p:sp>
-        <p:nvSpPr>
-          <p:cNvPr id="3" name="Text Placeholder 2">
-            <a:extLst>
-              <a:ext uri="{FF2B5EF4-FFF2-40B4-BE49-F238E27FC236}">
-                <a16:creationId xmlns:a16="http://schemas.microsoft.com/office/drawing/2014/main" id="{4478AAB7-2F44-4A5D-8186-8ED194649749}"/>
-              </a:ext>
-            </a:extLst>
-          </p:cNvPr>
+            <a:endParaRPr lang="en-US" dirty="0"/>
+          </a:p>
+        </p:txBody>
+      </p:sp>
+      <p:sp>
+        <p:nvSpPr>
+          <p:cNvPr id="3" name="Text Placeholder 2"/>
           <p:cNvSpPr>
             <a:spLocks noGrp="1"/>
           </p:cNvSpPr>
@@ -1559,8 +1366,8 @@
         </p:nvSpPr>
         <p:spPr>
           <a:xfrm>
-            <a:off x="839788" y="1681163"/>
-            <a:ext cx="5157787" cy="823912"/>
+            <a:off x="682329" y="1681163"/>
+            <a:ext cx="4190702" cy="823912"/>
           </a:xfrm>
         </p:spPr>
         <p:txBody>
@@ -1614,13 +1421,7 @@
       </p:sp>
       <p:sp>
         <p:nvSpPr>
-          <p:cNvPr id="4" name="Content Placeholder 3">
-            <a:extLst>
-              <a:ext uri="{FF2B5EF4-FFF2-40B4-BE49-F238E27FC236}">
-                <a16:creationId xmlns:a16="http://schemas.microsoft.com/office/drawing/2014/main" id="{0E950F20-6E99-4BB0-B422-5F53DDB1255E}"/>
-              </a:ext>
-            </a:extLst>
-          </p:cNvPr>
+          <p:cNvPr id="4" name="Content Placeholder 3"/>
           <p:cNvSpPr>
             <a:spLocks noGrp="1"/>
           </p:cNvSpPr>
@@ -1630,8 +1431,8 @@
         </p:nvSpPr>
         <p:spPr>
           <a:xfrm>
-            <a:off x="839788" y="2505075"/>
-            <a:ext cx="5157787" cy="3684588"/>
+            <a:off x="682329" y="2505075"/>
+            <a:ext cx="4190702" cy="3684588"/>
           </a:xfrm>
         </p:spPr>
         <p:txBody>
@@ -1671,18 +1472,13 @@
               <a:rPr lang="en-US"/>
               <a:t>Fifth level</a:t>
             </a:r>
-          </a:p>
-        </p:txBody>
-      </p:sp>
-      <p:sp>
-        <p:nvSpPr>
-          <p:cNvPr id="5" name="Text Placeholder 4">
-            <a:extLst>
-              <a:ext uri="{FF2B5EF4-FFF2-40B4-BE49-F238E27FC236}">
-                <a16:creationId xmlns:a16="http://schemas.microsoft.com/office/drawing/2014/main" id="{D7C025C2-F33D-4942-B66B-373849D3DD44}"/>
-              </a:ext>
-            </a:extLst>
-          </p:cNvPr>
+            <a:endParaRPr lang="en-US" dirty="0"/>
+          </a:p>
+        </p:txBody>
+      </p:sp>
+      <p:sp>
+        <p:nvSpPr>
+          <p:cNvPr id="5" name="Text Placeholder 4"/>
           <p:cNvSpPr>
             <a:spLocks noGrp="1"/>
           </p:cNvSpPr>
@@ -1692,8 +1488,8 @@
         </p:nvSpPr>
         <p:spPr>
           <a:xfrm>
-            <a:off x="6172200" y="1681163"/>
-            <a:ext cx="5183188" cy="823912"/>
+            <a:off x="5014913" y="1681163"/>
+            <a:ext cx="4211340" cy="823912"/>
           </a:xfrm>
         </p:spPr>
         <p:txBody>
@@ -1747,13 +1543,7 @@
       </p:sp>
       <p:sp>
         <p:nvSpPr>
-          <p:cNvPr id="6" name="Content Placeholder 5">
-            <a:extLst>
-              <a:ext uri="{FF2B5EF4-FFF2-40B4-BE49-F238E27FC236}">
-                <a16:creationId xmlns:a16="http://schemas.microsoft.com/office/drawing/2014/main" id="{A02D9696-FCA1-4742-894D-4786E24C8AC8}"/>
-              </a:ext>
-            </a:extLst>
-          </p:cNvPr>
+          <p:cNvPr id="6" name="Content Placeholder 5"/>
           <p:cNvSpPr>
             <a:spLocks noGrp="1"/>
           </p:cNvSpPr>
@@ -1763,8 +1553,8 @@
         </p:nvSpPr>
         <p:spPr>
           <a:xfrm>
-            <a:off x="6172200" y="2505075"/>
-            <a:ext cx="5183188" cy="3684588"/>
+            <a:off x="5014913" y="2505075"/>
+            <a:ext cx="4211340" cy="3684588"/>
           </a:xfrm>
         </p:spPr>
         <p:txBody>
@@ -1804,18 +1594,13 @@
               <a:rPr lang="en-US"/>
               <a:t>Fifth level</a:t>
             </a:r>
-          </a:p>
-        </p:txBody>
-      </p:sp>
-      <p:sp>
-        <p:nvSpPr>
-          <p:cNvPr id="7" name="Date Placeholder 6">
-            <a:extLst>
-              <a:ext uri="{FF2B5EF4-FFF2-40B4-BE49-F238E27FC236}">
-                <a16:creationId xmlns:a16="http://schemas.microsoft.com/office/drawing/2014/main" id="{155E2FC8-9C43-4843-8786-C8A7A5CEC45F}"/>
-              </a:ext>
-            </a:extLst>
-          </p:cNvPr>
+            <a:endParaRPr lang="en-US" dirty="0"/>
+          </a:p>
+        </p:txBody>
+      </p:sp>
+      <p:sp>
+        <p:nvSpPr>
+          <p:cNvPr id="7" name="Date Placeholder 6"/>
           <p:cNvSpPr>
             <a:spLocks noGrp="1"/>
           </p:cNvSpPr>
@@ -1830,7 +1615,7 @@
           <a:p>
             <a:fld id="{241EB5C9-1307-BA42-ABA2-0BC069CD8E7F}" type="datetimeFigureOut">
               <a:rPr lang="en-US" smtClean="0"/>
-              <a:t>1/18/2019</a:t>
+              <a:t>1/19/2019</a:t>
             </a:fld>
             <a:endParaRPr lang="en-US"/>
           </a:p>
@@ -1838,13 +1623,7 @@
       </p:sp>
       <p:sp>
         <p:nvSpPr>
-          <p:cNvPr id="8" name="Footer Placeholder 7">
-            <a:extLst>
-              <a:ext uri="{FF2B5EF4-FFF2-40B4-BE49-F238E27FC236}">
-                <a16:creationId xmlns:a16="http://schemas.microsoft.com/office/drawing/2014/main" id="{D5BEFFE7-1A87-4E56-B38C-7AE531173154}"/>
-              </a:ext>
-            </a:extLst>
-          </p:cNvPr>
+          <p:cNvPr id="8" name="Footer Placeholder 7"/>
           <p:cNvSpPr>
             <a:spLocks noGrp="1"/>
           </p:cNvSpPr>
@@ -1863,13 +1642,7 @@
       </p:sp>
       <p:sp>
         <p:nvSpPr>
-          <p:cNvPr id="9" name="Slide Number Placeholder 8">
-            <a:extLst>
-              <a:ext uri="{FF2B5EF4-FFF2-40B4-BE49-F238E27FC236}">
-                <a16:creationId xmlns:a16="http://schemas.microsoft.com/office/drawing/2014/main" id="{BF688CF6-0107-489D-9F46-F6664814301C}"/>
-              </a:ext>
-            </a:extLst>
-          </p:cNvPr>
+          <p:cNvPr id="9" name="Slide Number Placeholder 8"/>
           <p:cNvSpPr>
             <a:spLocks noGrp="1"/>
           </p:cNvSpPr>
@@ -1893,7 +1666,7 @@
     </p:spTree>
     <p:extLst>
       <p:ext uri="{BB962C8B-B14F-4D97-AF65-F5344CB8AC3E}">
-        <p14:creationId xmlns:p14="http://schemas.microsoft.com/office/powerpoint/2010/main" val="3519311195"/>
+        <p14:creationId xmlns:p14="http://schemas.microsoft.com/office/powerpoint/2010/main" val="1132776142"/>
       </p:ext>
     </p:extLst>
   </p:cSld>
@@ -1922,13 +1695,7 @@
       </p:grpSpPr>
       <p:sp>
         <p:nvSpPr>
-          <p:cNvPr id="2" name="Title 1">
-            <a:extLst>
-              <a:ext uri="{FF2B5EF4-FFF2-40B4-BE49-F238E27FC236}">
-                <a16:creationId xmlns:a16="http://schemas.microsoft.com/office/drawing/2014/main" id="{86E377CB-469C-499D-BED1-DF94550CCFC8}"/>
-              </a:ext>
-            </a:extLst>
-          </p:cNvPr>
+          <p:cNvPr id="2" name="Title 1"/>
           <p:cNvSpPr>
             <a:spLocks noGrp="1"/>
           </p:cNvSpPr>
@@ -1945,18 +1712,13 @@
               <a:rPr lang="en-US"/>
               <a:t>Click to edit Master title style</a:t>
             </a:r>
-          </a:p>
-        </p:txBody>
-      </p:sp>
-      <p:sp>
-        <p:nvSpPr>
-          <p:cNvPr id="3" name="Date Placeholder 2">
-            <a:extLst>
-              <a:ext uri="{FF2B5EF4-FFF2-40B4-BE49-F238E27FC236}">
-                <a16:creationId xmlns:a16="http://schemas.microsoft.com/office/drawing/2014/main" id="{406F0E0C-6855-494C-A0FF-7A2C4ECF2E15}"/>
-              </a:ext>
-            </a:extLst>
-          </p:cNvPr>
+            <a:endParaRPr lang="en-US" dirty="0"/>
+          </a:p>
+        </p:txBody>
+      </p:sp>
+      <p:sp>
+        <p:nvSpPr>
+          <p:cNvPr id="3" name="Date Placeholder 2"/>
           <p:cNvSpPr>
             <a:spLocks noGrp="1"/>
           </p:cNvSpPr>
@@ -1971,7 +1733,7 @@
           <a:p>
             <a:fld id="{241EB5C9-1307-BA42-ABA2-0BC069CD8E7F}" type="datetimeFigureOut">
               <a:rPr lang="en-US" smtClean="0"/>
-              <a:t>1/18/2019</a:t>
+              <a:t>1/19/2019</a:t>
             </a:fld>
             <a:endParaRPr lang="en-US"/>
           </a:p>
@@ -1979,13 +1741,7 @@
       </p:sp>
       <p:sp>
         <p:nvSpPr>
-          <p:cNvPr id="4" name="Footer Placeholder 3">
-            <a:extLst>
-              <a:ext uri="{FF2B5EF4-FFF2-40B4-BE49-F238E27FC236}">
-                <a16:creationId xmlns:a16="http://schemas.microsoft.com/office/drawing/2014/main" id="{86031866-7ADB-4201-8D0D-3856CC4B2FBF}"/>
-              </a:ext>
-            </a:extLst>
-          </p:cNvPr>
+          <p:cNvPr id="4" name="Footer Placeholder 3"/>
           <p:cNvSpPr>
             <a:spLocks noGrp="1"/>
           </p:cNvSpPr>
@@ -2004,13 +1760,7 @@
       </p:sp>
       <p:sp>
         <p:nvSpPr>
-          <p:cNvPr id="5" name="Slide Number Placeholder 4">
-            <a:extLst>
-              <a:ext uri="{FF2B5EF4-FFF2-40B4-BE49-F238E27FC236}">
-                <a16:creationId xmlns:a16="http://schemas.microsoft.com/office/drawing/2014/main" id="{C27AF159-6006-4663-8781-7D6CD1911B51}"/>
-              </a:ext>
-            </a:extLst>
-          </p:cNvPr>
+          <p:cNvPr id="5" name="Slide Number Placeholder 4"/>
           <p:cNvSpPr>
             <a:spLocks noGrp="1"/>
           </p:cNvSpPr>
@@ -2034,7 +1784,7 @@
     </p:spTree>
     <p:extLst>
       <p:ext uri="{BB962C8B-B14F-4D97-AF65-F5344CB8AC3E}">
-        <p14:creationId xmlns:p14="http://schemas.microsoft.com/office/powerpoint/2010/main" val="2573615858"/>
+        <p14:creationId xmlns:p14="http://schemas.microsoft.com/office/powerpoint/2010/main" val="2041129549"/>
       </p:ext>
     </p:extLst>
   </p:cSld>
@@ -2063,13 +1813,7 @@
       </p:grpSpPr>
       <p:sp>
         <p:nvSpPr>
-          <p:cNvPr id="2" name="Date Placeholder 1">
-            <a:extLst>
-              <a:ext uri="{FF2B5EF4-FFF2-40B4-BE49-F238E27FC236}">
-                <a16:creationId xmlns:a16="http://schemas.microsoft.com/office/drawing/2014/main" id="{20353C0E-35E5-4F10-8523-5212EBB15571}"/>
-              </a:ext>
-            </a:extLst>
-          </p:cNvPr>
+          <p:cNvPr id="2" name="Date Placeholder 1"/>
           <p:cNvSpPr>
             <a:spLocks noGrp="1"/>
           </p:cNvSpPr>
@@ -2084,7 +1828,7 @@
           <a:p>
             <a:fld id="{241EB5C9-1307-BA42-ABA2-0BC069CD8E7F}" type="datetimeFigureOut">
               <a:rPr lang="en-US" smtClean="0"/>
-              <a:t>1/18/2019</a:t>
+              <a:t>1/19/2019</a:t>
             </a:fld>
             <a:endParaRPr lang="en-US"/>
           </a:p>
@@ -2092,13 +1836,7 @@
       </p:sp>
       <p:sp>
         <p:nvSpPr>
-          <p:cNvPr id="3" name="Footer Placeholder 2">
-            <a:extLst>
-              <a:ext uri="{FF2B5EF4-FFF2-40B4-BE49-F238E27FC236}">
-                <a16:creationId xmlns:a16="http://schemas.microsoft.com/office/drawing/2014/main" id="{4582E718-37D3-4D10-8C90-27F310C8D50E}"/>
-              </a:ext>
-            </a:extLst>
-          </p:cNvPr>
+          <p:cNvPr id="3" name="Footer Placeholder 2"/>
           <p:cNvSpPr>
             <a:spLocks noGrp="1"/>
           </p:cNvSpPr>
@@ -2117,13 +1855,7 @@
       </p:sp>
       <p:sp>
         <p:nvSpPr>
-          <p:cNvPr id="4" name="Slide Number Placeholder 3">
-            <a:extLst>
-              <a:ext uri="{FF2B5EF4-FFF2-40B4-BE49-F238E27FC236}">
-                <a16:creationId xmlns:a16="http://schemas.microsoft.com/office/drawing/2014/main" id="{C36A97C5-E8D8-4217-9C7A-037E7E4E842C}"/>
-              </a:ext>
-            </a:extLst>
-          </p:cNvPr>
+          <p:cNvPr id="4" name="Slide Number Placeholder 3"/>
           <p:cNvSpPr>
             <a:spLocks noGrp="1"/>
           </p:cNvSpPr>
@@ -2147,7 +1879,7 @@
     </p:spTree>
     <p:extLst>
       <p:ext uri="{BB962C8B-B14F-4D97-AF65-F5344CB8AC3E}">
-        <p14:creationId xmlns:p14="http://schemas.microsoft.com/office/powerpoint/2010/main" val="232928138"/>
+        <p14:creationId xmlns:p14="http://schemas.microsoft.com/office/powerpoint/2010/main" val="3512238338"/>
       </p:ext>
     </p:extLst>
   </p:cSld>
@@ -2176,13 +1908,7 @@
       </p:grpSpPr>
       <p:sp>
         <p:nvSpPr>
-          <p:cNvPr id="2" name="Title 1">
-            <a:extLst>
-              <a:ext uri="{FF2B5EF4-FFF2-40B4-BE49-F238E27FC236}">
-                <a16:creationId xmlns:a16="http://schemas.microsoft.com/office/drawing/2014/main" id="{83B6B055-DCB7-4066-BABB-2365D9F0DD1C}"/>
-              </a:ext>
-            </a:extLst>
-          </p:cNvPr>
+          <p:cNvPr id="2" name="Title 1"/>
           <p:cNvSpPr>
             <a:spLocks noGrp="1"/>
           </p:cNvSpPr>
@@ -2192,8 +1918,8 @@
         </p:nvSpPr>
         <p:spPr>
           <a:xfrm>
-            <a:off x="839788" y="457200"/>
-            <a:ext cx="3932237" cy="1600200"/>
+            <a:off x="682328" y="457200"/>
+            <a:ext cx="3194943" cy="1600200"/>
           </a:xfrm>
         </p:spPr>
         <p:txBody>
@@ -2208,18 +1934,13 @@
               <a:rPr lang="en-US"/>
               <a:t>Click to edit Master title style</a:t>
             </a:r>
-          </a:p>
-        </p:txBody>
-      </p:sp>
-      <p:sp>
-        <p:nvSpPr>
-          <p:cNvPr id="3" name="Content Placeholder 2">
-            <a:extLst>
-              <a:ext uri="{FF2B5EF4-FFF2-40B4-BE49-F238E27FC236}">
-                <a16:creationId xmlns:a16="http://schemas.microsoft.com/office/drawing/2014/main" id="{75F795FA-8CE6-491C-BBB0-4470C1D3912A}"/>
-              </a:ext>
-            </a:extLst>
-          </p:cNvPr>
+            <a:endParaRPr lang="en-US" dirty="0"/>
+          </a:p>
+        </p:txBody>
+      </p:sp>
+      <p:sp>
+        <p:nvSpPr>
+          <p:cNvPr id="3" name="Content Placeholder 2"/>
           <p:cNvSpPr>
             <a:spLocks noGrp="1"/>
           </p:cNvSpPr>
@@ -2229,8 +1950,8 @@
         </p:nvSpPr>
         <p:spPr>
           <a:xfrm>
-            <a:off x="5183188" y="987425"/>
-            <a:ext cx="6172200" cy="4873625"/>
+            <a:off x="4211340" y="987427"/>
+            <a:ext cx="5014913" cy="4873625"/>
           </a:xfrm>
         </p:spPr>
         <p:txBody>
@@ -2298,18 +2019,13 @@
               <a:rPr lang="en-US"/>
               <a:t>Fifth level</a:t>
             </a:r>
-          </a:p>
-        </p:txBody>
-      </p:sp>
-      <p:sp>
-        <p:nvSpPr>
-          <p:cNvPr id="4" name="Text Placeholder 3">
-            <a:extLst>
-              <a:ext uri="{FF2B5EF4-FFF2-40B4-BE49-F238E27FC236}">
-                <a16:creationId xmlns:a16="http://schemas.microsoft.com/office/drawing/2014/main" id="{D8566B44-E58C-4946-9C6B-637B33DC4BA6}"/>
-              </a:ext>
-            </a:extLst>
-          </p:cNvPr>
+            <a:endParaRPr lang="en-US" dirty="0"/>
+          </a:p>
+        </p:txBody>
+      </p:sp>
+      <p:sp>
+        <p:nvSpPr>
+          <p:cNvPr id="4" name="Text Placeholder 3"/>
           <p:cNvSpPr>
             <a:spLocks noGrp="1"/>
           </p:cNvSpPr>
@@ -2319,8 +2035,8 @@
         </p:nvSpPr>
         <p:spPr>
           <a:xfrm>
-            <a:off x="839788" y="2057400"/>
-            <a:ext cx="3932237" cy="3811588"/>
+            <a:off x="682328" y="2057400"/>
+            <a:ext cx="3194943" cy="3811588"/>
           </a:xfrm>
         </p:spPr>
         <p:txBody>
@@ -2374,13 +2090,7 @@
       </p:sp>
       <p:sp>
         <p:nvSpPr>
-          <p:cNvPr id="5" name="Date Placeholder 4">
-            <a:extLst>
-              <a:ext uri="{FF2B5EF4-FFF2-40B4-BE49-F238E27FC236}">
-                <a16:creationId xmlns:a16="http://schemas.microsoft.com/office/drawing/2014/main" id="{10CB6293-384B-49CA-9B4C-F152AB40965E}"/>
-              </a:ext>
-            </a:extLst>
-          </p:cNvPr>
+          <p:cNvPr id="5" name="Date Placeholder 4"/>
           <p:cNvSpPr>
             <a:spLocks noGrp="1"/>
           </p:cNvSpPr>
@@ -2395,7 +2105,7 @@
           <a:p>
             <a:fld id="{241EB5C9-1307-BA42-ABA2-0BC069CD8E7F}" type="datetimeFigureOut">
               <a:rPr lang="en-US" smtClean="0"/>
-              <a:t>1/18/2019</a:t>
+              <a:t>1/19/2019</a:t>
             </a:fld>
             <a:endParaRPr lang="en-US"/>
           </a:p>
@@ -2403,13 +2113,7 @@
       </p:sp>
       <p:sp>
         <p:nvSpPr>
-          <p:cNvPr id="6" name="Footer Placeholder 5">
-            <a:extLst>
-              <a:ext uri="{FF2B5EF4-FFF2-40B4-BE49-F238E27FC236}">
-                <a16:creationId xmlns:a16="http://schemas.microsoft.com/office/drawing/2014/main" id="{8635C00E-98F6-4C6A-95E7-46CF0A524E19}"/>
-              </a:ext>
-            </a:extLst>
-          </p:cNvPr>
+          <p:cNvPr id="6" name="Footer Placeholder 5"/>
           <p:cNvSpPr>
             <a:spLocks noGrp="1"/>
           </p:cNvSpPr>
@@ -2428,13 +2132,7 @@
       </p:sp>
       <p:sp>
         <p:nvSpPr>
-          <p:cNvPr id="7" name="Slide Number Placeholder 6">
-            <a:extLst>
-              <a:ext uri="{FF2B5EF4-FFF2-40B4-BE49-F238E27FC236}">
-                <a16:creationId xmlns:a16="http://schemas.microsoft.com/office/drawing/2014/main" id="{3F270905-0414-43E8-9482-41C4248EB673}"/>
-              </a:ext>
-            </a:extLst>
-          </p:cNvPr>
+          <p:cNvPr id="7" name="Slide Number Placeholder 6"/>
           <p:cNvSpPr>
             <a:spLocks noGrp="1"/>
           </p:cNvSpPr>
@@ -2458,7 +2156,7 @@
     </p:spTree>
     <p:extLst>
       <p:ext uri="{BB962C8B-B14F-4D97-AF65-F5344CB8AC3E}">
-        <p14:creationId xmlns:p14="http://schemas.microsoft.com/office/powerpoint/2010/main" val="1289980476"/>
+        <p14:creationId xmlns:p14="http://schemas.microsoft.com/office/powerpoint/2010/main" val="3358370881"/>
       </p:ext>
     </p:extLst>
   </p:cSld>
@@ -2487,13 +2185,7 @@
       </p:grpSpPr>
       <p:sp>
         <p:nvSpPr>
-          <p:cNvPr id="2" name="Title 1">
-            <a:extLst>
-              <a:ext uri="{FF2B5EF4-FFF2-40B4-BE49-F238E27FC236}">
-                <a16:creationId xmlns:a16="http://schemas.microsoft.com/office/drawing/2014/main" id="{F4273805-602A-41BE-A935-35D3DE042A77}"/>
-              </a:ext>
-            </a:extLst>
-          </p:cNvPr>
+          <p:cNvPr id="2" name="Title 1"/>
           <p:cNvSpPr>
             <a:spLocks noGrp="1"/>
           </p:cNvSpPr>
@@ -2503,8 +2195,8 @@
         </p:nvSpPr>
         <p:spPr>
           <a:xfrm>
-            <a:off x="839788" y="457200"/>
-            <a:ext cx="3932237" cy="1600200"/>
+            <a:off x="682328" y="457200"/>
+            <a:ext cx="3194943" cy="1600200"/>
           </a:xfrm>
         </p:spPr>
         <p:txBody>
@@ -2519,20 +2211,15 @@
               <a:rPr lang="en-US"/>
               <a:t>Click to edit Master title style</a:t>
             </a:r>
-          </a:p>
-        </p:txBody>
-      </p:sp>
-      <p:sp>
-        <p:nvSpPr>
-          <p:cNvPr id="3" name="Picture Placeholder 2">
-            <a:extLst>
-              <a:ext uri="{FF2B5EF4-FFF2-40B4-BE49-F238E27FC236}">
-                <a16:creationId xmlns:a16="http://schemas.microsoft.com/office/drawing/2014/main" id="{A0FA997E-C839-4282-9EF9-76723698345B}"/>
-              </a:ext>
-            </a:extLst>
-          </p:cNvPr>
-          <p:cNvSpPr>
-            <a:spLocks noGrp="1"/>
+            <a:endParaRPr lang="en-US" dirty="0"/>
+          </a:p>
+        </p:txBody>
+      </p:sp>
+      <p:sp>
+        <p:nvSpPr>
+          <p:cNvPr id="3" name="Picture Placeholder 2"/>
+          <p:cNvSpPr>
+            <a:spLocks noGrp="1" noChangeAspect="1"/>
           </p:cNvSpPr>
           <p:nvPr>
             <p:ph type="pic" idx="1"/>
@@ -2540,12 +2227,12 @@
         </p:nvSpPr>
         <p:spPr>
           <a:xfrm>
-            <a:off x="5183188" y="987425"/>
-            <a:ext cx="6172200" cy="4873625"/>
+            <a:off x="4211340" y="987427"/>
+            <a:ext cx="5014913" cy="4873625"/>
           </a:xfrm>
         </p:spPr>
         <p:txBody>
-          <a:bodyPr/>
+          <a:bodyPr anchor="t"/>
           <a:lstStyle>
             <a:lvl1pPr marL="0" indent="0">
               <a:buNone/>
@@ -2585,19 +2272,17 @@
             </a:lvl9pPr>
           </a:lstStyle>
           <a:p>
-            <a:endParaRPr lang="en-US"/>
-          </a:p>
-        </p:txBody>
-      </p:sp>
-      <p:sp>
-        <p:nvSpPr>
-          <p:cNvPr id="4" name="Text Placeholder 3">
-            <a:extLst>
-              <a:ext uri="{FF2B5EF4-FFF2-40B4-BE49-F238E27FC236}">
-                <a16:creationId xmlns:a16="http://schemas.microsoft.com/office/drawing/2014/main" id="{C601386B-85EE-4038-BAEB-D70D396C9049}"/>
-              </a:ext>
-            </a:extLst>
-          </p:cNvPr>
+            <a:r>
+              <a:rPr lang="en-US"/>
+              <a:t>Click icon to add picture</a:t>
+            </a:r>
+            <a:endParaRPr lang="en-US" dirty="0"/>
+          </a:p>
+        </p:txBody>
+      </p:sp>
+      <p:sp>
+        <p:nvSpPr>
+          <p:cNvPr id="4" name="Text Placeholder 3"/>
           <p:cNvSpPr>
             <a:spLocks noGrp="1"/>
           </p:cNvSpPr>
@@ -2607,8 +2292,8 @@
         </p:nvSpPr>
         <p:spPr>
           <a:xfrm>
-            <a:off x="839788" y="2057400"/>
-            <a:ext cx="3932237" cy="3811588"/>
+            <a:off x="682328" y="2057400"/>
+            <a:ext cx="3194943" cy="3811588"/>
           </a:xfrm>
         </p:spPr>
         <p:txBody>
@@ -2662,13 +2347,7 @@
       </p:sp>
       <p:sp>
         <p:nvSpPr>
-          <p:cNvPr id="5" name="Date Placeholder 4">
-            <a:extLst>
-              <a:ext uri="{FF2B5EF4-FFF2-40B4-BE49-F238E27FC236}">
-                <a16:creationId xmlns:a16="http://schemas.microsoft.com/office/drawing/2014/main" id="{67A75861-F210-473C-8660-57A9E3A17D96}"/>
-              </a:ext>
-            </a:extLst>
-          </p:cNvPr>
+          <p:cNvPr id="5" name="Date Placeholder 4"/>
           <p:cNvSpPr>
             <a:spLocks noGrp="1"/>
           </p:cNvSpPr>
@@ -2683,7 +2362,7 @@
           <a:p>
             <a:fld id="{241EB5C9-1307-BA42-ABA2-0BC069CD8E7F}" type="datetimeFigureOut">
               <a:rPr lang="en-US" smtClean="0"/>
-              <a:t>1/18/2019</a:t>
+              <a:t>1/19/2019</a:t>
             </a:fld>
             <a:endParaRPr lang="en-US"/>
           </a:p>
@@ -2691,13 +2370,7 @@
       </p:sp>
       <p:sp>
         <p:nvSpPr>
-          <p:cNvPr id="6" name="Footer Placeholder 5">
-            <a:extLst>
-              <a:ext uri="{FF2B5EF4-FFF2-40B4-BE49-F238E27FC236}">
-                <a16:creationId xmlns:a16="http://schemas.microsoft.com/office/drawing/2014/main" id="{516319B3-D4F7-44DA-A462-D2DC3F938CC3}"/>
-              </a:ext>
-            </a:extLst>
-          </p:cNvPr>
+          <p:cNvPr id="6" name="Footer Placeholder 5"/>
           <p:cNvSpPr>
             <a:spLocks noGrp="1"/>
           </p:cNvSpPr>
@@ -2716,13 +2389,7 @@
       </p:sp>
       <p:sp>
         <p:nvSpPr>
-          <p:cNvPr id="7" name="Slide Number Placeholder 6">
-            <a:extLst>
-              <a:ext uri="{FF2B5EF4-FFF2-40B4-BE49-F238E27FC236}">
-                <a16:creationId xmlns:a16="http://schemas.microsoft.com/office/drawing/2014/main" id="{E0B9BEB0-E385-4DA0-A911-B4CA7B9456FD}"/>
-              </a:ext>
-            </a:extLst>
-          </p:cNvPr>
+          <p:cNvPr id="7" name="Slide Number Placeholder 6"/>
           <p:cNvSpPr>
             <a:spLocks noGrp="1"/>
           </p:cNvSpPr>
@@ -2746,7 +2413,7 @@
     </p:spTree>
     <p:extLst>
       <p:ext uri="{BB962C8B-B14F-4D97-AF65-F5344CB8AC3E}">
-        <p14:creationId xmlns:p14="http://schemas.microsoft.com/office/powerpoint/2010/main" val="2882952015"/>
+        <p14:creationId xmlns:p14="http://schemas.microsoft.com/office/powerpoint/2010/main" val="283739394"/>
       </p:ext>
     </p:extLst>
   </p:cSld>
@@ -2780,13 +2447,7 @@
       </p:grpSpPr>
       <p:sp>
         <p:nvSpPr>
-          <p:cNvPr id="2" name="Title Placeholder 1">
-            <a:extLst>
-              <a:ext uri="{FF2B5EF4-FFF2-40B4-BE49-F238E27FC236}">
-                <a16:creationId xmlns:a16="http://schemas.microsoft.com/office/drawing/2014/main" id="{DBC45D13-120F-480A-AFA9-033881E2FAB9}"/>
-              </a:ext>
-            </a:extLst>
-          </p:cNvPr>
+          <p:cNvPr id="2" name="Title Placeholder 1"/>
           <p:cNvSpPr>
             <a:spLocks noGrp="1"/>
           </p:cNvSpPr>
@@ -2796,8 +2457,8 @@
         </p:nvSpPr>
         <p:spPr>
           <a:xfrm>
-            <a:off x="838200" y="365125"/>
-            <a:ext cx="10515600" cy="1325563"/>
+            <a:off x="681038" y="365127"/>
+            <a:ext cx="8543925" cy="1325563"/>
           </a:xfrm>
           <a:prstGeom prst="rect">
             <a:avLst/>
@@ -2818,13 +2479,7 @@
       </p:sp>
       <p:sp>
         <p:nvSpPr>
-          <p:cNvPr id="3" name="Text Placeholder 2">
-            <a:extLst>
-              <a:ext uri="{FF2B5EF4-FFF2-40B4-BE49-F238E27FC236}">
-                <a16:creationId xmlns:a16="http://schemas.microsoft.com/office/drawing/2014/main" id="{A2E14D72-3384-475A-A28D-F1CF596EB4F8}"/>
-              </a:ext>
-            </a:extLst>
-          </p:cNvPr>
+          <p:cNvPr id="3" name="Text Placeholder 2"/>
           <p:cNvSpPr>
             <a:spLocks noGrp="1"/>
           </p:cNvSpPr>
@@ -2834,8 +2489,8 @@
         </p:nvSpPr>
         <p:spPr>
           <a:xfrm>
-            <a:off x="838200" y="1825625"/>
-            <a:ext cx="10515600" cy="4351338"/>
+            <a:off x="681038" y="1825625"/>
+            <a:ext cx="8543925" cy="4351338"/>
           </a:xfrm>
           <a:prstGeom prst="rect">
             <a:avLst/>
@@ -2849,49 +2504,44 @@
           <a:p>
             <a:pPr lvl="0"/>
             <a:r>
-              <a:rPr lang="en-US" dirty="0"/>
+              <a:rPr lang="en-US"/>
               <a:t>Edit Master text styles</a:t>
             </a:r>
           </a:p>
           <a:p>
             <a:pPr lvl="1"/>
             <a:r>
-              <a:rPr lang="en-US" dirty="0"/>
+              <a:rPr lang="en-US"/>
               <a:t>Second level</a:t>
             </a:r>
           </a:p>
           <a:p>
             <a:pPr lvl="2"/>
             <a:r>
-              <a:rPr lang="en-US" dirty="0"/>
+              <a:rPr lang="en-US"/>
               <a:t>Third level</a:t>
             </a:r>
           </a:p>
           <a:p>
             <a:pPr lvl="3"/>
             <a:r>
-              <a:rPr lang="en-US" dirty="0"/>
+              <a:rPr lang="en-US"/>
               <a:t>Fourth level</a:t>
             </a:r>
           </a:p>
           <a:p>
             <a:pPr lvl="4"/>
             <a:r>
-              <a:rPr lang="en-US" dirty="0"/>
+              <a:rPr lang="en-US"/>
               <a:t>Fifth level</a:t>
             </a:r>
-          </a:p>
-        </p:txBody>
-      </p:sp>
-      <p:sp>
-        <p:nvSpPr>
-          <p:cNvPr id="4" name="Date Placeholder 3">
-            <a:extLst>
-              <a:ext uri="{FF2B5EF4-FFF2-40B4-BE49-F238E27FC236}">
-                <a16:creationId xmlns:a16="http://schemas.microsoft.com/office/drawing/2014/main" id="{BFB5E1F0-F3EB-4BC7-BC05-B26E5D972D47}"/>
-              </a:ext>
-            </a:extLst>
-          </p:cNvPr>
+            <a:endParaRPr lang="en-US" dirty="0"/>
+          </a:p>
+        </p:txBody>
+      </p:sp>
+      <p:sp>
+        <p:nvSpPr>
+          <p:cNvPr id="4" name="Date Placeholder 3"/>
           <p:cNvSpPr>
             <a:spLocks noGrp="1"/>
           </p:cNvSpPr>
@@ -2901,8 +2551,8 @@
         </p:nvSpPr>
         <p:spPr>
           <a:xfrm>
-            <a:off x="838200" y="6356350"/>
-            <a:ext cx="2743200" cy="365125"/>
+            <a:off x="681038" y="6356352"/>
+            <a:ext cx="2228850" cy="365125"/>
           </a:xfrm>
           <a:prstGeom prst="rect">
             <a:avLst/>
@@ -2924,7 +2574,7 @@
           <a:p>
             <a:fld id="{241EB5C9-1307-BA42-ABA2-0BC069CD8E7F}" type="datetimeFigureOut">
               <a:rPr lang="en-US" smtClean="0"/>
-              <a:t>1/18/2019</a:t>
+              <a:t>1/19/2019</a:t>
             </a:fld>
             <a:endParaRPr lang="en-US"/>
           </a:p>
@@ -2932,13 +2582,7 @@
       </p:sp>
       <p:sp>
         <p:nvSpPr>
-          <p:cNvPr id="5" name="Footer Placeholder 4">
-            <a:extLst>
-              <a:ext uri="{FF2B5EF4-FFF2-40B4-BE49-F238E27FC236}">
-                <a16:creationId xmlns:a16="http://schemas.microsoft.com/office/drawing/2014/main" id="{8CE62A4A-AEEE-4A22-B878-11F322F4D7AA}"/>
-              </a:ext>
-            </a:extLst>
-          </p:cNvPr>
+          <p:cNvPr id="5" name="Footer Placeholder 4"/>
           <p:cNvSpPr>
             <a:spLocks noGrp="1"/>
           </p:cNvSpPr>
@@ -2948,8 +2592,8 @@
         </p:nvSpPr>
         <p:spPr>
           <a:xfrm>
-            <a:off x="4038600" y="6356350"/>
-            <a:ext cx="4114800" cy="365125"/>
+            <a:off x="3281363" y="6356352"/>
+            <a:ext cx="3343275" cy="365125"/>
           </a:xfrm>
           <a:prstGeom prst="rect">
             <a:avLst/>
@@ -2975,13 +2619,7 @@
       </p:sp>
       <p:sp>
         <p:nvSpPr>
-          <p:cNvPr id="6" name="Slide Number Placeholder 5">
-            <a:extLst>
-              <a:ext uri="{FF2B5EF4-FFF2-40B4-BE49-F238E27FC236}">
-                <a16:creationId xmlns:a16="http://schemas.microsoft.com/office/drawing/2014/main" id="{56D64387-C259-4A98-B2D6-BB3735172DA2}"/>
-              </a:ext>
-            </a:extLst>
-          </p:cNvPr>
+          <p:cNvPr id="6" name="Slide Number Placeholder 5"/>
           <p:cNvSpPr>
             <a:spLocks noGrp="1"/>
           </p:cNvSpPr>
@@ -2991,8 +2629,8 @@
         </p:nvSpPr>
         <p:spPr>
           <a:xfrm>
-            <a:off x="8610600" y="6356350"/>
-            <a:ext cx="2743200" cy="365125"/>
+            <a:off x="6996113" y="6356352"/>
+            <a:ext cx="2228850" cy="365125"/>
           </a:xfrm>
           <a:prstGeom prst="rect">
             <a:avLst/>
@@ -3025,7 +2663,7 @@
           <p:cNvPr id="7" name="Picture 6" descr="A close up of a sign&#10;&#10;Description automatically generated">
             <a:extLst>
               <a:ext uri="{FF2B5EF4-FFF2-40B4-BE49-F238E27FC236}">
-                <a16:creationId xmlns:a16="http://schemas.microsoft.com/office/drawing/2014/main" id="{EF480DE0-4EBB-4EE0-9AFF-BAD61EB3B1DD}"/>
+                <a16:creationId xmlns:a16="http://schemas.microsoft.com/office/drawing/2014/main" id="{7DEDE7C0-BD85-460A-A7DE-618AF32CDEAF}"/>
               </a:ext>
             </a:extLst>
           </p:cNvPr>
@@ -3042,8 +2680,8 @@
         </p:blipFill>
         <p:spPr>
           <a:xfrm>
-            <a:off x="11433527" y="6176962"/>
-            <a:ext cx="758473" cy="681037"/>
+            <a:off x="9289741" y="6176963"/>
+            <a:ext cx="616259" cy="681037"/>
           </a:xfrm>
           <a:prstGeom prst="rect">
             <a:avLst/>
@@ -3053,23 +2691,23 @@
     </p:spTree>
     <p:extLst>
       <p:ext uri="{BB962C8B-B14F-4D97-AF65-F5344CB8AC3E}">
-        <p14:creationId xmlns:p14="http://schemas.microsoft.com/office/powerpoint/2010/main" val="2615672284"/>
+        <p14:creationId xmlns:p14="http://schemas.microsoft.com/office/powerpoint/2010/main" val="2957868525"/>
       </p:ext>
     </p:extLst>
   </p:cSld>
   <p:clrMap bg1="lt1" tx1="dk1" bg2="lt2" tx2="dk2" accent1="accent1" accent2="accent2" accent3="accent3" accent4="accent4" accent5="accent5" accent6="accent6" hlink="hlink" folHlink="folHlink"/>
   <p:sldLayoutIdLst>
-    <p:sldLayoutId id="2147483727" r:id="rId1"/>
-    <p:sldLayoutId id="2147483728" r:id="rId2"/>
-    <p:sldLayoutId id="2147483729" r:id="rId3"/>
-    <p:sldLayoutId id="2147483730" r:id="rId4"/>
-    <p:sldLayoutId id="2147483731" r:id="rId5"/>
-    <p:sldLayoutId id="2147483732" r:id="rId6"/>
-    <p:sldLayoutId id="2147483733" r:id="rId7"/>
-    <p:sldLayoutId id="2147483734" r:id="rId8"/>
-    <p:sldLayoutId id="2147483735" r:id="rId9"/>
-    <p:sldLayoutId id="2147483736" r:id="rId10"/>
-    <p:sldLayoutId id="2147483737" r:id="rId11"/>
+    <p:sldLayoutId id="2147483739" r:id="rId1"/>
+    <p:sldLayoutId id="2147483740" r:id="rId2"/>
+    <p:sldLayoutId id="2147483741" r:id="rId3"/>
+    <p:sldLayoutId id="2147483742" r:id="rId4"/>
+    <p:sldLayoutId id="2147483743" r:id="rId5"/>
+    <p:sldLayoutId id="2147483744" r:id="rId6"/>
+    <p:sldLayoutId id="2147483745" r:id="rId7"/>
+    <p:sldLayoutId id="2147483746" r:id="rId8"/>
+    <p:sldLayoutId id="2147483747" r:id="rId9"/>
+    <p:sldLayoutId id="2147483748" r:id="rId10"/>
+    <p:sldLayoutId id="2147483749" r:id="rId11"/>
   </p:sldLayoutIdLst>
   <p:txStyles>
     <p:titleStyle>
@@ -3081,7 +2719,7 @@
           <a:spcPct val="0"/>
         </a:spcBef>
         <a:buNone/>
-        <a:defRPr sz="5600" b="1" kern="1200">
+        <a:defRPr sz="4400" b="1" kern="1200">
           <a:solidFill>
             <a:schemeClr val="tx1"/>
           </a:solidFill>
@@ -3357,7 +2995,7 @@
 <file path=ppt/theme/theme1.xml><?xml version="1.0" encoding="utf-8"?>
 <a:theme xmlns:a="http://schemas.openxmlformats.org/drawingml/2006/main" name="Office Theme">
   <a:themeElements>
-    <a:clrScheme name="Office">
+    <a:clrScheme name="Office Theme">
       <a:dk1>
         <a:sysClr val="windowText" lastClr="000000"/>
       </a:dk1>
@@ -3395,19 +3033,19 @@
         <a:srgbClr val="954F72"/>
       </a:folHlink>
     </a:clrScheme>
-    <a:fontScheme name="URW Geometric">
+    <a:fontScheme name="Biolinum / Libertine">
       <a:majorFont>
-        <a:latin typeface="URW Geometric"/>
+        <a:latin typeface="Linux Biolinum O"/>
         <a:ea typeface=""/>
         <a:cs typeface=""/>
       </a:majorFont>
       <a:minorFont>
-        <a:latin typeface="URW Geometric"/>
+        <a:latin typeface="Linux Libertine O"/>
         <a:ea typeface=""/>
         <a:cs typeface=""/>
       </a:minorFont>
     </a:fontScheme>
-    <a:fmtScheme name="Office">
+    <a:fmtScheme name="Office Theme">
       <a:fillStyleLst>
         <a:solidFill>
           <a:schemeClr val="phClr"/>

</xml_diff>